<commit_message>
Updated presentation for Sep 21.
</commit_message>
<xml_diff>
--- a/presentation.pptx
+++ b/presentation.pptx
@@ -5,7 +5,7 @@
     <p:sldMasterId id="2147483672" r:id="rId1"/>
   </p:sldMasterIdLst>
   <p:notesMasterIdLst>
-    <p:notesMasterId r:id="rId21"/>
+    <p:notesMasterId r:id="rId20"/>
   </p:notesMasterIdLst>
   <p:sldIdLst>
     <p:sldId id="256" r:id="rId2"/>
@@ -26,34 +26,33 @@
     <p:sldId id="350" r:id="rId17"/>
     <p:sldId id="354" r:id="rId18"/>
     <p:sldId id="292" r:id="rId19"/>
-    <p:sldId id="359" r:id="rId20"/>
   </p:sldIdLst>
   <p:sldSz cx="9144000" cy="5143500" type="screen16x9"/>
   <p:notesSz cx="6858000" cy="9144000"/>
   <p:embeddedFontLst>
     <p:embeddedFont>
       <p:font typeface="Livvic" pitchFamily="2" charset="0"/>
-      <p:regular r:id="rId22"/>
-      <p:bold r:id="rId23"/>
-      <p:italic r:id="rId24"/>
-      <p:boldItalic r:id="rId25"/>
+      <p:regular r:id="rId21"/>
+      <p:bold r:id="rId22"/>
+      <p:italic r:id="rId23"/>
+      <p:boldItalic r:id="rId24"/>
     </p:embeddedFont>
     <p:embeddedFont>
-      <p:font typeface="Oswald" panose="020B0604020202020204" charset="0"/>
-      <p:regular r:id="rId26"/>
-      <p:bold r:id="rId27"/>
+      <p:font typeface="Oswald" panose="00000500000000000000" pitchFamily="2" charset="0"/>
+      <p:regular r:id="rId25"/>
+      <p:bold r:id="rId26"/>
     </p:embeddedFont>
     <p:embeddedFont>
       <p:font typeface="Roboto" panose="02000000000000000000" pitchFamily="2" charset="0"/>
-      <p:regular r:id="rId28"/>
-      <p:bold r:id="rId29"/>
-      <p:italic r:id="rId30"/>
-      <p:boldItalic r:id="rId31"/>
+      <p:regular r:id="rId27"/>
+      <p:bold r:id="rId28"/>
+      <p:italic r:id="rId29"/>
+      <p:boldItalic r:id="rId30"/>
     </p:embeddedFont>
     <p:embeddedFont>
       <p:font typeface="Roboto Condensed Light" panose="02000000000000000000" pitchFamily="2" charset="0"/>
-      <p:regular r:id="rId32"/>
-      <p:italic r:id="rId33"/>
+      <p:regular r:id="rId31"/>
+      <p:italic r:id="rId32"/>
     </p:embeddedFont>
   </p:embeddedFontLst>
   <p:defaultTextStyle>
@@ -1824,116 +1823,6 @@
         </p:txBody>
       </p:sp>
     </p:spTree>
-  </p:cSld>
-  <p:clrMapOvr>
-    <a:masterClrMapping/>
-  </p:clrMapOvr>
-</p:notes>
-</file>
-
-<file path=ppt/notesSlides/notesSlide19.xml><?xml version="1.0" encoding="utf-8"?>
-<p:notes xmlns:a="http://schemas.openxmlformats.org/drawingml/2006/main" xmlns:r="http://schemas.openxmlformats.org/officeDocument/2006/relationships" xmlns:p="http://schemas.openxmlformats.org/presentationml/2006/main" showMasterSp="0" showMasterPhAnim="0">
-  <p:cSld>
-    <p:spTree>
-      <p:nvGrpSpPr>
-        <p:cNvPr id="1" name="Shape 697"/>
-        <p:cNvGrpSpPr/>
-        <p:nvPr/>
-      </p:nvGrpSpPr>
-      <p:grpSpPr>
-        <a:xfrm>
-          <a:off x="0" y="0"/>
-          <a:ext cx="0" cy="0"/>
-          <a:chOff x="0" y="0"/>
-          <a:chExt cx="0" cy="0"/>
-        </a:xfrm>
-      </p:grpSpPr>
-      <p:sp>
-        <p:nvSpPr>
-          <p:cNvPr id="698" name="Google Shape;698;gad6c7e10c1_1_93:notes"/>
-          <p:cNvSpPr>
-            <a:spLocks noGrp="1" noRot="1" noChangeAspect="1"/>
-          </p:cNvSpPr>
-          <p:nvPr>
-            <p:ph type="sldImg" idx="2"/>
-          </p:nvPr>
-        </p:nvSpPr>
-        <p:spPr>
-          <a:xfrm>
-            <a:off x="381000" y="685800"/>
-            <a:ext cx="6096000" cy="3429000"/>
-          </a:xfrm>
-          <a:custGeom>
-            <a:avLst/>
-            <a:gdLst/>
-            <a:ahLst/>
-            <a:cxnLst/>
-            <a:rect l="l" t="t" r="r" b="b"/>
-            <a:pathLst>
-              <a:path w="120000" h="120000" extrusionOk="0">
-                <a:moveTo>
-                  <a:pt x="0" y="0"/>
-                </a:moveTo>
-                <a:lnTo>
-                  <a:pt x="120000" y="0"/>
-                </a:lnTo>
-                <a:lnTo>
-                  <a:pt x="120000" y="120000"/>
-                </a:lnTo>
-                <a:lnTo>
-                  <a:pt x="0" y="120000"/>
-                </a:lnTo>
-                <a:close/>
-              </a:path>
-            </a:pathLst>
-          </a:custGeom>
-        </p:spPr>
-      </p:sp>
-      <p:sp>
-        <p:nvSpPr>
-          <p:cNvPr id="699" name="Google Shape;699;gad6c7e10c1_1_93:notes"/>
-          <p:cNvSpPr txBox="1">
-            <a:spLocks noGrp="1"/>
-          </p:cNvSpPr>
-          <p:nvPr>
-            <p:ph type="body" idx="1"/>
-          </p:nvPr>
-        </p:nvSpPr>
-        <p:spPr>
-          <a:xfrm>
-            <a:off x="685800" y="4343400"/>
-            <a:ext cx="5486400" cy="4114800"/>
-          </a:xfrm>
-          <a:prstGeom prst="rect">
-            <a:avLst/>
-          </a:prstGeom>
-        </p:spPr>
-        <p:txBody>
-          <a:bodyPr spcFirstLastPara="1" wrap="square" lIns="91425" tIns="91425" rIns="91425" bIns="91425" anchor="t" anchorCtr="0">
-            <a:noAutofit/>
-          </a:bodyPr>
-          <a:lstStyle/>
-          <a:p>
-            <a:pPr marL="171450" lvl="0" indent="-171450" algn="l" rtl="0">
-              <a:spcBef>
-                <a:spcPts val="0"/>
-              </a:spcBef>
-              <a:spcAft>
-                <a:spcPts val="0"/>
-              </a:spcAft>
-              <a:buFontTx/>
-              <a:buChar char="-"/>
-            </a:pPr>
-            <a:endParaRPr dirty="0"/>
-          </a:p>
-        </p:txBody>
-      </p:sp>
-    </p:spTree>
-    <p:extLst>
-      <p:ext uri="{BB962C8B-B14F-4D97-AF65-F5344CB8AC3E}">
-        <p14:creationId xmlns:p14="http://schemas.microsoft.com/office/powerpoint/2010/main" val="457927933"/>
-      </p:ext>
-    </p:extLst>
   </p:cSld>
   <p:clrMapOvr>
     <a:masterClrMapping/>
@@ -16775,7 +16664,7 @@
             </a:pPr>
             <a:r>
               <a:rPr lang="en" dirty="0"/>
-              <a:t>06.07.2021</a:t>
+              <a:t>21.09.2021</a:t>
             </a:r>
           </a:p>
           <a:p>
@@ -16789,7 +16678,34 @@
               <a:buNone/>
             </a:pPr>
             <a:r>
-              <a:rPr lang="en-US" dirty="0"/>
+              <a:rPr lang="en-US" dirty="0" err="1">
+                <a:solidFill>
+                  <a:schemeClr val="accent2"/>
+                </a:solidFill>
+              </a:rPr>
+              <a:t>Frachtwerk</a:t>
+            </a:r>
+            <a:r>
+              <a:rPr lang="en-US" dirty="0">
+                <a:solidFill>
+                  <a:schemeClr val="accent2"/>
+                </a:solidFill>
+              </a:rPr>
+              <a:t> GmbH </a:t>
+            </a:r>
+            <a:br>
+              <a:rPr lang="en-US" dirty="0">
+                <a:solidFill>
+                  <a:schemeClr val="accent2"/>
+                </a:solidFill>
+              </a:rPr>
+            </a:br>
+            <a:r>
+              <a:rPr lang="en-US" dirty="0">
+                <a:solidFill>
+                  <a:schemeClr val="accent2"/>
+                </a:solidFill>
+              </a:rPr>
               <a:t>HTW Berlin</a:t>
             </a:r>
           </a:p>
@@ -19546,21 +19462,8 @@
                   <a:schemeClr val="accent2"/>
                 </a:solidFill>
               </a:rPr>
-              <a:t> </a:t>
+              <a:t> Services</a:t>
             </a:r>
-            <a:r>
-              <a:rPr lang="de-DE" sz="2000" dirty="0" err="1">
-                <a:solidFill>
-                  <a:schemeClr val="accent2"/>
-                </a:solidFill>
-              </a:rPr>
-              <a:t>services</a:t>
-            </a:r>
-            <a:endParaRPr lang="de-DE" sz="2000" dirty="0">
-              <a:solidFill>
-                <a:schemeClr val="accent2"/>
-              </a:solidFill>
-            </a:endParaRPr>
           </a:p>
         </p:txBody>
       </p:sp>
@@ -20538,7 +20441,7 @@
                   <a:schemeClr val="accent2"/>
                 </a:solidFill>
               </a:rPr>
-              <a:t>maintain</a:t>
+              <a:t>Maintain</a:t>
             </a:r>
             <a:r>
               <a:rPr lang="de-DE" sz="2000" dirty="0">
@@ -20546,23 +20449,7 @@
                   <a:schemeClr val="accent2"/>
                 </a:solidFill>
               </a:rPr>
-              <a:t> </a:t>
-            </a:r>
-            <a:r>
-              <a:rPr lang="de-DE" sz="2000" dirty="0" err="1">
-                <a:solidFill>
-                  <a:schemeClr val="accent2"/>
-                </a:solidFill>
-              </a:rPr>
-              <a:t>performance</a:t>
-            </a:r>
-            <a:r>
-              <a:rPr lang="de-DE" sz="2000" dirty="0">
-                <a:solidFill>
-                  <a:schemeClr val="accent2"/>
-                </a:solidFill>
-              </a:rPr>
-              <a:t>?</a:t>
+              <a:t> Performance?</a:t>
             </a:r>
           </a:p>
         </p:txBody>
@@ -21271,15 +21158,7 @@
           <a:p>
             <a:r>
               <a:rPr lang="de-DE" sz="1200" dirty="0"/>
-              <a:t>Big Data Analytics, HTW Berlin – </a:t>
-            </a:r>
-            <a:r>
-              <a:rPr lang="de-DE" sz="1200" dirty="0" err="1"/>
-              <a:t>July</a:t>
-            </a:r>
-            <a:r>
-              <a:rPr lang="de-DE" sz="1200" dirty="0"/>
-              <a:t> 06, 2021 – Slide 10/19</a:t>
+              <a:t>Big Data Analytics, HTW Berlin – September 21, 2021 – Slide 10/19</a:t>
             </a:r>
           </a:p>
         </p:txBody>
@@ -23416,30 +23295,58 @@
               <a:buNone/>
             </a:pPr>
             <a:r>
-              <a:rPr lang="de-DE" dirty="0"/>
+              <a:rPr lang="de-DE" dirty="0">
+                <a:solidFill>
+                  <a:schemeClr val="accent2"/>
+                </a:solidFill>
+              </a:rPr>
               <a:t>Enhancement </a:t>
             </a:r>
             <a:r>
-              <a:rPr lang="de-DE" dirty="0" err="1"/>
+              <a:rPr lang="de-DE" dirty="0" err="1">
+                <a:solidFill>
+                  <a:schemeClr val="accent2"/>
+                </a:solidFill>
+              </a:rPr>
               <a:t>of</a:t>
             </a:r>
             <a:r>
-              <a:rPr lang="de-DE" dirty="0"/>
+              <a:rPr lang="de-DE" dirty="0">
+                <a:solidFill>
+                  <a:schemeClr val="accent2"/>
+                </a:solidFill>
+              </a:rPr>
               <a:t> </a:t>
             </a:r>
             <a:r>
-              <a:rPr lang="de-DE" dirty="0" err="1"/>
+              <a:rPr lang="de-DE" dirty="0" err="1">
+                <a:solidFill>
+                  <a:schemeClr val="accent2"/>
+                </a:solidFill>
+              </a:rPr>
               <a:t>existing</a:t>
             </a:r>
             <a:r>
-              <a:rPr lang="de-DE" dirty="0"/>
+              <a:rPr lang="de-DE" dirty="0">
+                <a:solidFill>
+                  <a:schemeClr val="accent2"/>
+                </a:solidFill>
+              </a:rPr>
               <a:t> </a:t>
             </a:r>
             <a:r>
-              <a:rPr lang="de-DE" dirty="0" err="1"/>
+              <a:rPr lang="de-DE" dirty="0" err="1">
+                <a:solidFill>
+                  <a:schemeClr val="accent2"/>
+                </a:solidFill>
+              </a:rPr>
               <a:t>data</a:t>
             </a:r>
-            <a:endParaRPr dirty="0"/>
+            <a:endParaRPr dirty="0">
+              <a:solidFill>
+                <a:schemeClr val="accent2"/>
+              </a:solidFill>
+            </a:endParaRPr>
           </a:p>
         </p:txBody>
       </p:sp>
@@ -24132,86 +24039,6 @@
       </p:pic>
       <p:sp>
         <p:nvSpPr>
-          <p:cNvPr id="30" name="Textfeld 29">
-            <a:extLst>
-              <a:ext uri="{FF2B5EF4-FFF2-40B4-BE49-F238E27FC236}">
-                <a16:creationId xmlns:a16="http://schemas.microsoft.com/office/drawing/2014/main" id="{A17EC19F-CC66-479E-B2B3-DC25E721CCB3}"/>
-              </a:ext>
-            </a:extLst>
-          </p:cNvPr>
-          <p:cNvSpPr txBox="1"/>
-          <p:nvPr/>
-        </p:nvSpPr>
-        <p:spPr>
-          <a:xfrm>
-            <a:off x="2335884" y="2671468"/>
-            <a:ext cx="500458" cy="215444"/>
-          </a:xfrm>
-          <a:prstGeom prst="rect">
-            <a:avLst/>
-          </a:prstGeom>
-          <a:noFill/>
-        </p:spPr>
-        <p:txBody>
-          <a:bodyPr wrap="none" rtlCol="0">
-            <a:spAutoFit/>
-          </a:bodyPr>
-          <a:lstStyle/>
-          <a:p>
-            <a:r>
-              <a:rPr lang="de-DE" sz="800" dirty="0">
-                <a:solidFill>
-                  <a:schemeClr val="bg1"/>
-                </a:solidFill>
-                <a:latin typeface="+mn-lt"/>
-              </a:rPr>
-              <a:t>[Fig. 8]</a:t>
-            </a:r>
-          </a:p>
-        </p:txBody>
-      </p:sp>
-      <p:sp>
-        <p:nvSpPr>
-          <p:cNvPr id="31" name="Textfeld 30">
-            <a:extLst>
-              <a:ext uri="{FF2B5EF4-FFF2-40B4-BE49-F238E27FC236}">
-                <a16:creationId xmlns:a16="http://schemas.microsoft.com/office/drawing/2014/main" id="{187F2159-4D84-4FD8-A67E-4FDA924325D3}"/>
-              </a:ext>
-            </a:extLst>
-          </p:cNvPr>
-          <p:cNvSpPr txBox="1"/>
-          <p:nvPr/>
-        </p:nvSpPr>
-        <p:spPr>
-          <a:xfrm>
-            <a:off x="987998" y="2704707"/>
-            <a:ext cx="500458" cy="215444"/>
-          </a:xfrm>
-          <a:prstGeom prst="rect">
-            <a:avLst/>
-          </a:prstGeom>
-          <a:noFill/>
-        </p:spPr>
-        <p:txBody>
-          <a:bodyPr wrap="none" rtlCol="0">
-            <a:spAutoFit/>
-          </a:bodyPr>
-          <a:lstStyle/>
-          <a:p>
-            <a:r>
-              <a:rPr lang="de-DE" sz="800" dirty="0">
-                <a:solidFill>
-                  <a:schemeClr val="bg1"/>
-                </a:solidFill>
-                <a:latin typeface="+mn-lt"/>
-              </a:rPr>
-              <a:t>[Fig. 9]</a:t>
-            </a:r>
-          </a:p>
-        </p:txBody>
-      </p:sp>
-      <p:sp>
-        <p:nvSpPr>
           <p:cNvPr id="34" name="Google Shape;701;p28">
             <a:extLst>
               <a:ext uri="{FF2B5EF4-FFF2-40B4-BE49-F238E27FC236}">
@@ -24491,15 +24318,7 @@
           <a:p>
             <a:r>
               <a:rPr lang="de-DE" sz="1200" dirty="0"/>
-              <a:t>Big Data Analytics, HTW Berlin – </a:t>
-            </a:r>
-            <a:r>
-              <a:rPr lang="de-DE" sz="1200" dirty="0" err="1"/>
-              <a:t>July</a:t>
-            </a:r>
-            <a:r>
-              <a:rPr lang="de-DE" sz="1200" dirty="0"/>
-              <a:t> 06, 2021 – Slide 12/19</a:t>
+              <a:t>Big Data Analytics, HTW Berlin – September 21, 2021 – Slide 12/19</a:t>
             </a:r>
           </a:p>
         </p:txBody>
@@ -24586,7 +24405,7 @@
             </a:pPr>
             <a:r>
               <a:rPr lang="en-US" dirty="0"/>
-              <a:t>ETL process on basis data</a:t>
+              <a:t>ETL Process on Basis Data</a:t>
             </a:r>
           </a:p>
         </p:txBody>
@@ -25365,15 +25184,7 @@
           <a:p>
             <a:r>
               <a:rPr lang="de-DE" sz="1200" dirty="0"/>
-              <a:t>Big Data Analytics, HTW Berlin – </a:t>
-            </a:r>
-            <a:r>
-              <a:rPr lang="de-DE" sz="1200" dirty="0" err="1"/>
-              <a:t>July</a:t>
-            </a:r>
-            <a:r>
-              <a:rPr lang="de-DE" sz="1200" dirty="0"/>
-              <a:t> 06, 2021 – Slide 13/19</a:t>
+              <a:t>Big Data Analytics, HTW Berlin – September 21, 2021 – Slide 13/19</a:t>
             </a:r>
           </a:p>
         </p:txBody>
@@ -25450,28 +25261,44 @@
           <a:lstStyle/>
           <a:p>
             <a:r>
-              <a:rPr lang="de-DE" dirty="0"/>
+              <a:rPr lang="de-DE" dirty="0">
+                <a:solidFill>
+                  <a:schemeClr val="accent2"/>
+                </a:solidFill>
+              </a:rPr>
               <a:t>Enhancement </a:t>
             </a:r>
             <a:r>
-              <a:rPr lang="de-DE" dirty="0" err="1"/>
+              <a:rPr lang="de-DE" dirty="0" err="1">
+                <a:solidFill>
+                  <a:schemeClr val="accent2"/>
+                </a:solidFill>
+              </a:rPr>
               <a:t>of</a:t>
             </a:r>
             <a:r>
-              <a:rPr lang="de-DE" dirty="0"/>
+              <a:rPr lang="de-DE" dirty="0">
+                <a:solidFill>
+                  <a:schemeClr val="accent2"/>
+                </a:solidFill>
+              </a:rPr>
               <a:t> </a:t>
             </a:r>
             <a:r>
-              <a:rPr lang="de-DE" dirty="0" err="1"/>
-              <a:t>existing</a:t>
+              <a:rPr lang="de-DE" dirty="0" err="1">
+                <a:solidFill>
+                  <a:schemeClr val="accent2"/>
+                </a:solidFill>
+              </a:rPr>
+              <a:t>Existing</a:t>
             </a:r>
             <a:r>
-              <a:rPr lang="de-DE" dirty="0"/>
-              <a:t> </a:t>
-            </a:r>
-            <a:r>
-              <a:rPr lang="de-DE" dirty="0" err="1"/>
-              <a:t>data</a:t>
+              <a:rPr lang="de-DE" dirty="0">
+                <a:solidFill>
+                  <a:schemeClr val="accent2"/>
+                </a:solidFill>
+              </a:rPr>
+              <a:t> Data</a:t>
             </a:r>
             <a:br>
               <a:rPr lang="de-DE" dirty="0"/>
@@ -25810,7 +25637,7 @@
                 <a:cs typeface="Oswald"/>
                 <a:sym typeface="Oswald"/>
               </a:rPr>
-              <a:t>A- MX-Records</a:t>
+              <a:t>A- &amp; MX-Records</a:t>
             </a:r>
           </a:p>
         </p:txBody>
@@ -27765,15 +27592,7 @@
           <a:p>
             <a:r>
               <a:rPr lang="de-DE" sz="1200" dirty="0"/>
-              <a:t>Big Data Analytics, HTW Berlin – </a:t>
-            </a:r>
-            <a:r>
-              <a:rPr lang="de-DE" sz="1200" dirty="0" err="1"/>
-              <a:t>July</a:t>
-            </a:r>
-            <a:r>
-              <a:rPr lang="de-DE" sz="1200" dirty="0"/>
-              <a:t> 06, 2021 – Slide 14/19</a:t>
+              <a:t>Big Data Analytics, HTW Berlin – September 21, 2021 – Slide 14/19</a:t>
             </a:r>
           </a:p>
         </p:txBody>
@@ -27849,19 +27668,7 @@
             </a:r>
             <a:r>
               <a:rPr lang="de-DE" dirty="0"/>
-              <a:t> </a:t>
-            </a:r>
-            <a:r>
-              <a:rPr lang="de-DE" dirty="0" err="1"/>
-              <a:t>further</a:t>
-            </a:r>
-            <a:r>
-              <a:rPr lang="de-DE" dirty="0"/>
-              <a:t> </a:t>
-            </a:r>
-            <a:r>
-              <a:rPr lang="de-DE" dirty="0" err="1"/>
-              <a:t>information</a:t>
+              <a:t> Further Information</a:t>
             </a:r>
             <a:endParaRPr lang="en-US" dirty="0"/>
           </a:p>
@@ -28163,7 +27970,7 @@
                 <a:cs typeface="Oswald"/>
                 <a:sym typeface="Oswald"/>
               </a:rPr>
-              <a:t>A and MX-Records</a:t>
+              <a:t>A- and MX-Records</a:t>
             </a:r>
           </a:p>
         </p:txBody>
@@ -29361,53 +29168,8 @@
                 <a:cs typeface="Oswald"/>
                 <a:sym typeface="Oswald"/>
               </a:rPr>
-              <a:t>Redirects and </a:t>
+              <a:t>Redirects and Status Codes</a:t>
             </a:r>
-            <a:r>
-              <a:rPr lang="de-DE" sz="1800" dirty="0" err="1">
-                <a:solidFill>
-                  <a:schemeClr val="accent4"/>
-                </a:solidFill>
-                <a:latin typeface="Oswald"/>
-                <a:ea typeface="Oswald"/>
-                <a:cs typeface="Oswald"/>
-                <a:sym typeface="Oswald"/>
-              </a:rPr>
-              <a:t>status</a:t>
-            </a:r>
-            <a:r>
-              <a:rPr lang="de-DE" sz="1800" dirty="0">
-                <a:solidFill>
-                  <a:schemeClr val="accent4"/>
-                </a:solidFill>
-                <a:latin typeface="Oswald"/>
-                <a:ea typeface="Oswald"/>
-                <a:cs typeface="Oswald"/>
-                <a:sym typeface="Oswald"/>
-              </a:rPr>
-              <a:t> </a:t>
-            </a:r>
-            <a:r>
-              <a:rPr lang="de-DE" sz="1800" dirty="0" err="1">
-                <a:solidFill>
-                  <a:schemeClr val="accent4"/>
-                </a:solidFill>
-                <a:latin typeface="Oswald"/>
-                <a:ea typeface="Oswald"/>
-                <a:cs typeface="Oswald"/>
-                <a:sym typeface="Oswald"/>
-              </a:rPr>
-              <a:t>codes</a:t>
-            </a:r>
-            <a:endParaRPr lang="de-DE" sz="1800" dirty="0">
-              <a:solidFill>
-                <a:schemeClr val="accent4"/>
-              </a:solidFill>
-              <a:latin typeface="Oswald"/>
-              <a:ea typeface="Oswald"/>
-              <a:cs typeface="Oswald"/>
-              <a:sym typeface="Oswald"/>
-            </a:endParaRPr>
           </a:p>
         </p:txBody>
       </p:sp>
@@ -30178,15 +29940,7 @@
           <a:p>
             <a:r>
               <a:rPr lang="de-DE" sz="1200" dirty="0"/>
-              <a:t>Big Data Analytics, HTW Berlin – </a:t>
-            </a:r>
-            <a:r>
-              <a:rPr lang="de-DE" sz="1200" dirty="0" err="1"/>
-              <a:t>July</a:t>
-            </a:r>
-            <a:r>
-              <a:rPr lang="de-DE" sz="1200" dirty="0"/>
-              <a:t> 06, 2021 – Slide 15/19</a:t>
+              <a:t>Big Data Analytics, HTW Berlin – September 21, 2021 – Slide 15/19</a:t>
             </a:r>
           </a:p>
         </p:txBody>
@@ -30256,19 +30010,7 @@
             </a:r>
             <a:r>
               <a:rPr lang="de-DE" dirty="0"/>
-              <a:t> </a:t>
-            </a:r>
-            <a:r>
-              <a:rPr lang="de-DE" dirty="0" err="1"/>
-              <a:t>further</a:t>
-            </a:r>
-            <a:r>
-              <a:rPr lang="de-DE" dirty="0"/>
-              <a:t> </a:t>
-            </a:r>
-            <a:r>
-              <a:rPr lang="de-DE" dirty="0" err="1"/>
-              <a:t>information</a:t>
+              <a:t> Further Information</a:t>
             </a:r>
             <a:endParaRPr lang="en-US" dirty="0"/>
           </a:p>
@@ -30570,7 +30312,7 @@
                 <a:cs typeface="Oswald"/>
                 <a:sym typeface="Oswald"/>
               </a:rPr>
-              <a:t>IPv6-availability</a:t>
+              <a:t>IPv6-Availability</a:t>
             </a:r>
           </a:p>
         </p:txBody>
@@ -30861,7 +30603,15 @@
             </a:pPr>
             <a:r>
               <a:rPr lang="en-US" dirty="0"/>
-              <a:t>Returns Boolean and error code</a:t>
+              <a:t>Returns </a:t>
+            </a:r>
+            <a:r>
+              <a:rPr lang="en-US" dirty="0" err="1"/>
+              <a:t>boolean</a:t>
+            </a:r>
+            <a:r>
+              <a:rPr lang="en-US" dirty="0"/>
+              <a:t> and error code</a:t>
             </a:r>
           </a:p>
         </p:txBody>
@@ -32529,15 +32279,7 @@
           <a:p>
             <a:r>
               <a:rPr lang="de-DE" sz="1200" dirty="0"/>
-              <a:t>Big Data Analytics, HTW Berlin – </a:t>
-            </a:r>
-            <a:r>
-              <a:rPr lang="de-DE" sz="1200" dirty="0" err="1"/>
-              <a:t>July</a:t>
-            </a:r>
-            <a:r>
-              <a:rPr lang="de-DE" sz="1200" dirty="0"/>
-              <a:t> 06, 2021 – Slide 16/19</a:t>
+              <a:t>Big Data Analytics, HTW Berlin – September 21, 2021 – Slide 16/19</a:t>
             </a:r>
           </a:p>
         </p:txBody>
@@ -34384,797 +34126,6 @@
         </p:txBody>
       </p:sp>
     </p:spTree>
-  </p:cSld>
-  <p:clrMapOvr>
-    <a:masterClrMapping/>
-  </p:clrMapOvr>
-</p:sld>
-</file>
-
-<file path=ppt/slides/slide19.xml><?xml version="1.0" encoding="utf-8"?>
-<p:sld xmlns:a="http://schemas.openxmlformats.org/drawingml/2006/main" xmlns:r="http://schemas.openxmlformats.org/officeDocument/2006/relationships" xmlns:p="http://schemas.openxmlformats.org/presentationml/2006/main">
-  <p:cSld>
-    <p:spTree>
-      <p:nvGrpSpPr>
-        <p:cNvPr id="1" name="Shape 700"/>
-        <p:cNvGrpSpPr/>
-        <p:nvPr/>
-      </p:nvGrpSpPr>
-      <p:grpSpPr>
-        <a:xfrm>
-          <a:off x="0" y="0"/>
-          <a:ext cx="0" cy="0"/>
-          <a:chOff x="0" y="0"/>
-          <a:chExt cx="0" cy="0"/>
-        </a:xfrm>
-      </p:grpSpPr>
-      <p:sp>
-        <p:nvSpPr>
-          <p:cNvPr id="3" name="Titel 2">
-            <a:extLst>
-              <a:ext uri="{FF2B5EF4-FFF2-40B4-BE49-F238E27FC236}">
-                <a16:creationId xmlns:a16="http://schemas.microsoft.com/office/drawing/2014/main" id="{FDB9F6E3-B655-409E-86B4-FC0A726D5E3A}"/>
-              </a:ext>
-            </a:extLst>
-          </p:cNvPr>
-          <p:cNvSpPr>
-            <a:spLocks noGrp="1"/>
-          </p:cNvSpPr>
-          <p:nvPr>
-            <p:ph type="title"/>
-          </p:nvPr>
-        </p:nvSpPr>
-        <p:spPr/>
-        <p:txBody>
-          <a:bodyPr/>
-          <a:lstStyle/>
-          <a:p>
-            <a:r>
-              <a:rPr lang="de-DE" dirty="0"/>
-              <a:t>Image Sources</a:t>
-            </a:r>
-          </a:p>
-        </p:txBody>
-      </p:sp>
-      <p:sp>
-        <p:nvSpPr>
-          <p:cNvPr id="5" name="Google Shape;702;p28">
-            <a:extLst>
-              <a:ext uri="{FF2B5EF4-FFF2-40B4-BE49-F238E27FC236}">
-                <a16:creationId xmlns:a16="http://schemas.microsoft.com/office/drawing/2014/main" id="{0B6A0EEC-4434-4863-8B2C-2A2EDDFD7DEC}"/>
-              </a:ext>
-            </a:extLst>
-          </p:cNvPr>
-          <p:cNvSpPr txBox="1">
-            <a:spLocks noGrp="1"/>
-          </p:cNvSpPr>
-          <p:nvPr>
-            <p:ph type="body" idx="1"/>
-          </p:nvPr>
-        </p:nvSpPr>
-        <p:spPr>
-          <a:xfrm>
-            <a:off x="719998" y="1104850"/>
-            <a:ext cx="8102029" cy="3143400"/>
-          </a:xfrm>
-          <a:prstGeom prst="rect">
-            <a:avLst/>
-          </a:prstGeom>
-        </p:spPr>
-        <p:txBody>
-          <a:bodyPr spcFirstLastPara="1" wrap="square" lIns="91425" tIns="91425" rIns="91425" bIns="91425" anchor="t" anchorCtr="0">
-            <a:noAutofit/>
-          </a:bodyPr>
-          <a:lstStyle/>
-          <a:p>
-            <a:pPr marL="0" indent="0">
-              <a:buSzPts val="1100"/>
-              <a:buNone/>
-            </a:pPr>
-            <a:r>
-              <a:rPr lang="en-AU" sz="800" dirty="0">
-                <a:solidFill>
-                  <a:schemeClr val="bg1"/>
-                </a:solidFill>
-              </a:rPr>
-              <a:t>[1]: CRISP-DM cycle: </a:t>
-            </a:r>
-            <a:r>
-              <a:rPr lang="en-AU" sz="800" dirty="0">
-                <a:solidFill>
-                  <a:schemeClr val="bg1"/>
-                </a:solidFill>
-                <a:hlinkClick r:id="rId3"/>
-              </a:rPr>
-              <a:t>https://miro.medium.com/max/1200/1*2NajmK58hJf8lJQm25iXWw.png</a:t>
-            </a:r>
-            <a:r>
-              <a:rPr lang="en-AU" sz="800" dirty="0">
-                <a:solidFill>
-                  <a:schemeClr val="bg1"/>
-                </a:solidFill>
-              </a:rPr>
-              <a:t> [04.07.2021]</a:t>
-            </a:r>
-          </a:p>
-          <a:p>
-            <a:pPr marL="0" indent="0">
-              <a:buSzPts val="1100"/>
-              <a:buNone/>
-            </a:pPr>
-            <a:r>
-              <a:rPr lang="en-AU" sz="800" dirty="0">
-                <a:solidFill>
-                  <a:schemeClr val="bg1"/>
-                </a:solidFill>
-              </a:rPr>
-              <a:t>[2]: Docker Icon: </a:t>
-            </a:r>
-            <a:r>
-              <a:rPr lang="en-AU" sz="800" dirty="0">
-                <a:solidFill>
-                  <a:schemeClr val="bg1"/>
-                </a:solidFill>
-                <a:hlinkClick r:id="rId4"/>
-              </a:rPr>
-              <a:t>https://static.hosting.de/helpdesk/de/anleitungen/server/images/docker/Moby-logo.png</a:t>
-            </a:r>
-            <a:r>
-              <a:rPr lang="en-AU" sz="800" dirty="0">
-                <a:solidFill>
-                  <a:schemeClr val="bg1"/>
-                </a:solidFill>
-              </a:rPr>
-              <a:t> (04.07.2021)</a:t>
-            </a:r>
-          </a:p>
-          <a:p>
-            <a:pPr marL="0" indent="0">
-              <a:buSzPts val="1100"/>
-              <a:buNone/>
-            </a:pPr>
-            <a:r>
-              <a:rPr lang="en-AU" sz="800" dirty="0">
-                <a:solidFill>
-                  <a:schemeClr val="bg1"/>
-                </a:solidFill>
-              </a:rPr>
-              <a:t>[3]: </a:t>
-            </a:r>
-            <a:r>
-              <a:rPr lang="it-IT" sz="800" dirty="0">
-                <a:solidFill>
-                  <a:schemeClr val="bg1"/>
-                </a:solidFill>
-              </a:rPr>
-              <a:t>Docker Compose </a:t>
-            </a:r>
-            <a:r>
-              <a:rPr lang="it-IT" sz="800" dirty="0" err="1">
-                <a:solidFill>
-                  <a:schemeClr val="bg1"/>
-                </a:solidFill>
-              </a:rPr>
-              <a:t>Icon</a:t>
-            </a:r>
-            <a:r>
-              <a:rPr lang="it-IT" sz="800" dirty="0">
-                <a:solidFill>
-                  <a:schemeClr val="bg1"/>
-                </a:solidFill>
-              </a:rPr>
-              <a:t>: </a:t>
-            </a:r>
-            <a:r>
-              <a:rPr lang="it-IT" sz="800" dirty="0">
-                <a:solidFill>
-                  <a:schemeClr val="bg1"/>
-                </a:solidFill>
-                <a:hlinkClick r:id="rId5"/>
-              </a:rPr>
-              <a:t>https://i1.wp.com/www.docker.com/blog/wp-content/uploads/2020/02/Compose.png?resize=200%2C219&amp;ssl=1</a:t>
-            </a:r>
-            <a:r>
-              <a:rPr lang="it-IT" sz="800" dirty="0">
-                <a:solidFill>
-                  <a:schemeClr val="bg1"/>
-                </a:solidFill>
-              </a:rPr>
-              <a:t> (04.07.2021)</a:t>
-            </a:r>
-          </a:p>
-          <a:p>
-            <a:pPr marL="0" indent="0">
-              <a:buSzPts val="1100"/>
-              <a:buNone/>
-            </a:pPr>
-            <a:r>
-              <a:rPr lang="it-IT" sz="800" dirty="0">
-                <a:solidFill>
-                  <a:schemeClr val="bg1"/>
-                </a:solidFill>
-              </a:rPr>
-              <a:t>[4]: </a:t>
-            </a:r>
-            <a:r>
-              <a:rPr lang="es-ES" sz="800" dirty="0">
-                <a:solidFill>
-                  <a:schemeClr val="bg1"/>
-                </a:solidFill>
-              </a:rPr>
-              <a:t>Angular Icon: </a:t>
-            </a:r>
-            <a:r>
-              <a:rPr lang="es-ES" sz="800" dirty="0">
-                <a:solidFill>
-                  <a:schemeClr val="bg1"/>
-                </a:solidFill>
-                <a:hlinkClick r:id="rId6"/>
-              </a:rPr>
-              <a:t>https://heise.cloudimg.io/width/610/q85.png-lossy-85.webp-lossy-85.foil1/_www-heise-de_/imgs/18/2/9/7/6/1/8/9/Angular-0cce487a5e2b8b51.png</a:t>
-            </a:r>
-            <a:r>
-              <a:rPr lang="es-ES" sz="800" dirty="0">
-                <a:solidFill>
-                  <a:schemeClr val="bg1"/>
-                </a:solidFill>
-              </a:rPr>
-              <a:t> 	(04.07.2021)</a:t>
-            </a:r>
-          </a:p>
-          <a:p>
-            <a:pPr marL="0" indent="0">
-              <a:buSzPts val="1100"/>
-              <a:buNone/>
-            </a:pPr>
-            <a:r>
-              <a:rPr lang="es-ES" sz="800" dirty="0">
-                <a:solidFill>
-                  <a:schemeClr val="bg1"/>
-                </a:solidFill>
-              </a:rPr>
-              <a:t>[5]: Node.js Icon: </a:t>
-            </a:r>
-            <a:r>
-              <a:rPr lang="es-ES" sz="800" dirty="0">
-                <a:solidFill>
-                  <a:schemeClr val="bg1"/>
-                </a:solidFill>
-                <a:hlinkClick r:id="rId7"/>
-              </a:rPr>
-              <a:t>https://www.firestorm.ch/wp-content/uploads/2019/07/nodejs-1.png</a:t>
-            </a:r>
-            <a:r>
-              <a:rPr lang="es-ES" sz="800" dirty="0">
-                <a:solidFill>
-                  <a:schemeClr val="bg1"/>
-                </a:solidFill>
-              </a:rPr>
-              <a:t> (04.07.2021)</a:t>
-            </a:r>
-          </a:p>
-          <a:p>
-            <a:pPr marL="0" indent="0">
-              <a:buSzPts val="1100"/>
-              <a:buNone/>
-            </a:pPr>
-            <a:r>
-              <a:rPr lang="es-ES" sz="800" dirty="0">
-                <a:solidFill>
-                  <a:schemeClr val="bg1"/>
-                </a:solidFill>
-              </a:rPr>
-              <a:t>[6]: </a:t>
-            </a:r>
-            <a:r>
-              <a:rPr lang="it-IT" sz="800" dirty="0" err="1">
-                <a:solidFill>
-                  <a:schemeClr val="bg1"/>
-                </a:solidFill>
-              </a:rPr>
-              <a:t>Debian</a:t>
-            </a:r>
-            <a:r>
-              <a:rPr lang="it-IT" sz="800" dirty="0">
-                <a:solidFill>
-                  <a:schemeClr val="bg1"/>
-                </a:solidFill>
-              </a:rPr>
-              <a:t> </a:t>
-            </a:r>
-            <a:r>
-              <a:rPr lang="it-IT" sz="800" dirty="0" err="1">
-                <a:solidFill>
-                  <a:schemeClr val="bg1"/>
-                </a:solidFill>
-              </a:rPr>
-              <a:t>Icon</a:t>
-            </a:r>
-            <a:r>
-              <a:rPr lang="it-IT" sz="800" dirty="0">
-                <a:solidFill>
-                  <a:schemeClr val="bg1"/>
-                </a:solidFill>
-              </a:rPr>
-              <a:t>: </a:t>
-            </a:r>
-            <a:r>
-              <a:rPr lang="it-IT" sz="800" dirty="0">
-                <a:solidFill>
-                  <a:schemeClr val="bg1"/>
-                </a:solidFill>
-                <a:hlinkClick r:id="rId8"/>
-              </a:rPr>
-              <a:t>https://www.debian.org/Pics/debian-logo-1024x576.png</a:t>
-            </a:r>
-            <a:r>
-              <a:rPr lang="it-IT" sz="800" dirty="0">
-                <a:solidFill>
-                  <a:schemeClr val="bg1"/>
-                </a:solidFill>
-              </a:rPr>
-              <a:t> (04.07.2021)</a:t>
-            </a:r>
-          </a:p>
-          <a:p>
-            <a:pPr marL="0" indent="0">
-              <a:buSzPts val="1100"/>
-              <a:buNone/>
-            </a:pPr>
-            <a:r>
-              <a:rPr lang="it-IT" sz="800" dirty="0">
-                <a:solidFill>
-                  <a:schemeClr val="bg1"/>
-                </a:solidFill>
-              </a:rPr>
-              <a:t>[7]: </a:t>
-            </a:r>
-            <a:r>
-              <a:rPr lang="it-IT" sz="800" dirty="0" err="1">
-                <a:solidFill>
-                  <a:schemeClr val="bg1"/>
-                </a:solidFill>
-              </a:rPr>
-              <a:t>Postgres</a:t>
-            </a:r>
-            <a:r>
-              <a:rPr lang="it-IT" sz="800" dirty="0">
-                <a:solidFill>
-                  <a:schemeClr val="bg1"/>
-                </a:solidFill>
-              </a:rPr>
-              <a:t> </a:t>
-            </a:r>
-            <a:r>
-              <a:rPr lang="it-IT" sz="800" dirty="0" err="1">
-                <a:solidFill>
-                  <a:schemeClr val="bg1"/>
-                </a:solidFill>
-              </a:rPr>
-              <a:t>Icon</a:t>
-            </a:r>
-            <a:r>
-              <a:rPr lang="it-IT" sz="800" dirty="0">
-                <a:solidFill>
-                  <a:schemeClr val="bg1"/>
-                </a:solidFill>
-              </a:rPr>
-              <a:t>: </a:t>
-            </a:r>
-            <a:r>
-              <a:rPr lang="it-IT" sz="800" dirty="0">
-                <a:solidFill>
-                  <a:schemeClr val="bg1"/>
-                </a:solidFill>
-                <a:hlinkClick r:id="rId9"/>
-              </a:rPr>
-              <a:t>https://upload.wikimedia.org/wikipedia/de/4/4b/Postgresql.svg</a:t>
-            </a:r>
-            <a:r>
-              <a:rPr lang="it-IT" sz="800" dirty="0">
-                <a:solidFill>
-                  <a:schemeClr val="bg1"/>
-                </a:solidFill>
-              </a:rPr>
-              <a:t> (04.07.2021)</a:t>
-            </a:r>
-          </a:p>
-          <a:p>
-            <a:pPr marL="0" indent="0">
-              <a:buSzPts val="1100"/>
-              <a:buNone/>
-            </a:pPr>
-            <a:r>
-              <a:rPr lang="it-IT" sz="800" dirty="0">
-                <a:solidFill>
-                  <a:schemeClr val="bg1"/>
-                </a:solidFill>
-              </a:rPr>
-              <a:t>[8]: </a:t>
-            </a:r>
-            <a:r>
-              <a:rPr lang="de-DE" sz="800" dirty="0" err="1">
-                <a:solidFill>
-                  <a:schemeClr val="bg1"/>
-                </a:solidFill>
-              </a:rPr>
-              <a:t>PySpark</a:t>
-            </a:r>
-            <a:r>
-              <a:rPr lang="de-DE" sz="800" dirty="0">
-                <a:solidFill>
-                  <a:schemeClr val="bg1"/>
-                </a:solidFill>
-              </a:rPr>
-              <a:t> Icon: </a:t>
-            </a:r>
-            <a:r>
-              <a:rPr lang="de-DE" sz="800" dirty="0">
-                <a:solidFill>
-                  <a:schemeClr val="bg1"/>
-                </a:solidFill>
-                <a:hlinkClick r:id="rId10"/>
-              </a:rPr>
-              <a:t>https://miro.medium.com/max/1400/1*nPcdyVwgcuEZiEZiRqApug.jpeg</a:t>
-            </a:r>
-            <a:r>
-              <a:rPr lang="de-DE" sz="800" dirty="0">
-                <a:solidFill>
-                  <a:schemeClr val="bg1"/>
-                </a:solidFill>
-              </a:rPr>
-              <a:t> (04.07.2021)</a:t>
-            </a:r>
-          </a:p>
-          <a:p>
-            <a:pPr marL="0" indent="0">
-              <a:buSzPts val="1100"/>
-              <a:buNone/>
-            </a:pPr>
-            <a:r>
-              <a:rPr lang="de-DE" sz="800" dirty="0">
-                <a:solidFill>
-                  <a:schemeClr val="bg1"/>
-                </a:solidFill>
-              </a:rPr>
-              <a:t>[9]: </a:t>
-            </a:r>
-            <a:r>
-              <a:rPr lang="de-DE" sz="800" dirty="0" err="1">
-                <a:solidFill>
-                  <a:schemeClr val="bg1"/>
-                </a:solidFill>
-              </a:rPr>
-              <a:t>Jupyter</a:t>
-            </a:r>
-            <a:r>
-              <a:rPr lang="de-DE" sz="800" dirty="0">
-                <a:solidFill>
-                  <a:schemeClr val="bg1"/>
-                </a:solidFill>
-              </a:rPr>
-              <a:t> Icon: </a:t>
-            </a:r>
-            <a:r>
-              <a:rPr lang="de-DE" sz="800" dirty="0">
-                <a:solidFill>
-                  <a:schemeClr val="bg1"/>
-                </a:solidFill>
-                <a:hlinkClick r:id="rId11"/>
-              </a:rPr>
-              <a:t>https://upload.wikimedia.org/wikipedia/commons/thumb/3/38/Jupyter_logo.svg/414px-Jupyter_logo.svg.png</a:t>
-            </a:r>
-            <a:r>
-              <a:rPr lang="de-DE" sz="800" dirty="0">
-                <a:solidFill>
-                  <a:schemeClr val="bg1"/>
-                </a:solidFill>
-              </a:rPr>
-              <a:t> (04.07.2021)</a:t>
-            </a:r>
-          </a:p>
-        </p:txBody>
-      </p:sp>
-      <p:sp>
-        <p:nvSpPr>
-          <p:cNvPr id="6" name="Google Shape;701;p28">
-            <a:extLst>
-              <a:ext uri="{FF2B5EF4-FFF2-40B4-BE49-F238E27FC236}">
-                <a16:creationId xmlns:a16="http://schemas.microsoft.com/office/drawing/2014/main" id="{DA25F4E5-8E7D-4E6F-BC9F-39D62FAE9ADE}"/>
-              </a:ext>
-            </a:extLst>
-          </p:cNvPr>
-          <p:cNvSpPr txBox="1">
-            <a:spLocks/>
-          </p:cNvSpPr>
-          <p:nvPr/>
-        </p:nvSpPr>
-        <p:spPr>
-          <a:xfrm>
-            <a:off x="0" y="0"/>
-            <a:ext cx="4020398" cy="327025"/>
-          </a:xfrm>
-          <a:prstGeom prst="rect">
-            <a:avLst/>
-          </a:prstGeom>
-          <a:noFill/>
-          <a:ln>
-            <a:noFill/>
-          </a:ln>
-        </p:spPr>
-        <p:txBody>
-          <a:bodyPr spcFirstLastPara="1" wrap="square" lIns="91425" tIns="91425" rIns="91425" bIns="91425" anchor="t" anchorCtr="0">
-            <a:noAutofit/>
-          </a:bodyPr>
-          <a:lstStyle>
-            <a:defPPr marR="0" lvl="0" algn="l" rtl="0">
-              <a:lnSpc>
-                <a:spcPct val="100000"/>
-              </a:lnSpc>
-              <a:spcBef>
-                <a:spcPts val="0"/>
-              </a:spcBef>
-              <a:spcAft>
-                <a:spcPts val="0"/>
-              </a:spcAft>
-            </a:defPPr>
-            <a:lvl1pPr marR="0" lvl="0" algn="l" rtl="0">
-              <a:lnSpc>
-                <a:spcPct val="100000"/>
-              </a:lnSpc>
-              <a:spcBef>
-                <a:spcPts val="0"/>
-              </a:spcBef>
-              <a:spcAft>
-                <a:spcPts val="0"/>
-              </a:spcAft>
-              <a:buClr>
-                <a:schemeClr val="dk1"/>
-              </a:buClr>
-              <a:buSzPts val="2800"/>
-              <a:buFont typeface="Oswald"/>
-              <a:buNone/>
-              <a:defRPr sz="2800" b="0" i="0" u="none" strike="noStrike" cap="none">
-                <a:solidFill>
-                  <a:schemeClr val="dk1"/>
-                </a:solidFill>
-                <a:latin typeface="Oswald"/>
-                <a:ea typeface="Oswald"/>
-                <a:cs typeface="Oswald"/>
-                <a:sym typeface="Oswald"/>
-              </a:defRPr>
-            </a:lvl1pPr>
-            <a:lvl2pPr marR="0" lvl="1" algn="l" rtl="0">
-              <a:lnSpc>
-                <a:spcPct val="100000"/>
-              </a:lnSpc>
-              <a:spcBef>
-                <a:spcPts val="0"/>
-              </a:spcBef>
-              <a:spcAft>
-                <a:spcPts val="0"/>
-              </a:spcAft>
-              <a:buClr>
-                <a:schemeClr val="dk1"/>
-              </a:buClr>
-              <a:buSzPts val="2800"/>
-              <a:buFont typeface="Arial"/>
-              <a:buNone/>
-              <a:defRPr sz="2800" b="0" i="0" u="none" strike="noStrike" cap="none">
-                <a:solidFill>
-                  <a:schemeClr val="dk1"/>
-                </a:solidFill>
-                <a:latin typeface="Arial"/>
-                <a:ea typeface="Arial"/>
-                <a:cs typeface="Arial"/>
-                <a:sym typeface="Arial"/>
-              </a:defRPr>
-            </a:lvl2pPr>
-            <a:lvl3pPr marR="0" lvl="2" algn="l" rtl="0">
-              <a:lnSpc>
-                <a:spcPct val="100000"/>
-              </a:lnSpc>
-              <a:spcBef>
-                <a:spcPts val="0"/>
-              </a:spcBef>
-              <a:spcAft>
-                <a:spcPts val="0"/>
-              </a:spcAft>
-              <a:buClr>
-                <a:schemeClr val="dk1"/>
-              </a:buClr>
-              <a:buSzPts val="2800"/>
-              <a:buFont typeface="Arial"/>
-              <a:buNone/>
-              <a:defRPr sz="2800" b="0" i="0" u="none" strike="noStrike" cap="none">
-                <a:solidFill>
-                  <a:schemeClr val="dk1"/>
-                </a:solidFill>
-                <a:latin typeface="Arial"/>
-                <a:ea typeface="Arial"/>
-                <a:cs typeface="Arial"/>
-                <a:sym typeface="Arial"/>
-              </a:defRPr>
-            </a:lvl3pPr>
-            <a:lvl4pPr marR="0" lvl="3" algn="l" rtl="0">
-              <a:lnSpc>
-                <a:spcPct val="100000"/>
-              </a:lnSpc>
-              <a:spcBef>
-                <a:spcPts val="0"/>
-              </a:spcBef>
-              <a:spcAft>
-                <a:spcPts val="0"/>
-              </a:spcAft>
-              <a:buClr>
-                <a:schemeClr val="dk1"/>
-              </a:buClr>
-              <a:buSzPts val="2800"/>
-              <a:buFont typeface="Arial"/>
-              <a:buNone/>
-              <a:defRPr sz="2800" b="0" i="0" u="none" strike="noStrike" cap="none">
-                <a:solidFill>
-                  <a:schemeClr val="dk1"/>
-                </a:solidFill>
-                <a:latin typeface="Arial"/>
-                <a:ea typeface="Arial"/>
-                <a:cs typeface="Arial"/>
-                <a:sym typeface="Arial"/>
-              </a:defRPr>
-            </a:lvl4pPr>
-            <a:lvl5pPr marR="0" lvl="4" algn="l" rtl="0">
-              <a:lnSpc>
-                <a:spcPct val="100000"/>
-              </a:lnSpc>
-              <a:spcBef>
-                <a:spcPts val="0"/>
-              </a:spcBef>
-              <a:spcAft>
-                <a:spcPts val="0"/>
-              </a:spcAft>
-              <a:buClr>
-                <a:schemeClr val="dk1"/>
-              </a:buClr>
-              <a:buSzPts val="2800"/>
-              <a:buFont typeface="Arial"/>
-              <a:buNone/>
-              <a:defRPr sz="2800" b="0" i="0" u="none" strike="noStrike" cap="none">
-                <a:solidFill>
-                  <a:schemeClr val="dk1"/>
-                </a:solidFill>
-                <a:latin typeface="Arial"/>
-                <a:ea typeface="Arial"/>
-                <a:cs typeface="Arial"/>
-                <a:sym typeface="Arial"/>
-              </a:defRPr>
-            </a:lvl5pPr>
-            <a:lvl6pPr marR="0" lvl="5" algn="l" rtl="0">
-              <a:lnSpc>
-                <a:spcPct val="100000"/>
-              </a:lnSpc>
-              <a:spcBef>
-                <a:spcPts val="0"/>
-              </a:spcBef>
-              <a:spcAft>
-                <a:spcPts val="0"/>
-              </a:spcAft>
-              <a:buClr>
-                <a:schemeClr val="dk1"/>
-              </a:buClr>
-              <a:buSzPts val="2800"/>
-              <a:buFont typeface="Arial"/>
-              <a:buNone/>
-              <a:defRPr sz="2800" b="0" i="0" u="none" strike="noStrike" cap="none">
-                <a:solidFill>
-                  <a:schemeClr val="dk1"/>
-                </a:solidFill>
-                <a:latin typeface="Arial"/>
-                <a:ea typeface="Arial"/>
-                <a:cs typeface="Arial"/>
-                <a:sym typeface="Arial"/>
-              </a:defRPr>
-            </a:lvl6pPr>
-            <a:lvl7pPr marR="0" lvl="6" algn="l" rtl="0">
-              <a:lnSpc>
-                <a:spcPct val="100000"/>
-              </a:lnSpc>
-              <a:spcBef>
-                <a:spcPts val="0"/>
-              </a:spcBef>
-              <a:spcAft>
-                <a:spcPts val="0"/>
-              </a:spcAft>
-              <a:buClr>
-                <a:schemeClr val="dk1"/>
-              </a:buClr>
-              <a:buSzPts val="2800"/>
-              <a:buFont typeface="Arial"/>
-              <a:buNone/>
-              <a:defRPr sz="2800" b="0" i="0" u="none" strike="noStrike" cap="none">
-                <a:solidFill>
-                  <a:schemeClr val="dk1"/>
-                </a:solidFill>
-                <a:latin typeface="Arial"/>
-                <a:ea typeface="Arial"/>
-                <a:cs typeface="Arial"/>
-                <a:sym typeface="Arial"/>
-              </a:defRPr>
-            </a:lvl7pPr>
-            <a:lvl8pPr marR="0" lvl="7" algn="l" rtl="0">
-              <a:lnSpc>
-                <a:spcPct val="100000"/>
-              </a:lnSpc>
-              <a:spcBef>
-                <a:spcPts val="0"/>
-              </a:spcBef>
-              <a:spcAft>
-                <a:spcPts val="0"/>
-              </a:spcAft>
-              <a:buClr>
-                <a:schemeClr val="dk1"/>
-              </a:buClr>
-              <a:buSzPts val="2800"/>
-              <a:buFont typeface="Arial"/>
-              <a:buNone/>
-              <a:defRPr sz="2800" b="0" i="0" u="none" strike="noStrike" cap="none">
-                <a:solidFill>
-                  <a:schemeClr val="dk1"/>
-                </a:solidFill>
-                <a:latin typeface="Arial"/>
-                <a:ea typeface="Arial"/>
-                <a:cs typeface="Arial"/>
-                <a:sym typeface="Arial"/>
-              </a:defRPr>
-            </a:lvl8pPr>
-            <a:lvl9pPr marR="0" lvl="8" algn="l" rtl="0">
-              <a:lnSpc>
-                <a:spcPct val="100000"/>
-              </a:lnSpc>
-              <a:spcBef>
-                <a:spcPts val="0"/>
-              </a:spcBef>
-              <a:spcAft>
-                <a:spcPts val="0"/>
-              </a:spcAft>
-              <a:buClr>
-                <a:schemeClr val="dk1"/>
-              </a:buClr>
-              <a:buSzPts val="2800"/>
-              <a:buFont typeface="Arial"/>
-              <a:buNone/>
-              <a:defRPr sz="2800" b="0" i="0" u="none" strike="noStrike" cap="none">
-                <a:solidFill>
-                  <a:schemeClr val="dk1"/>
-                </a:solidFill>
-                <a:latin typeface="Arial"/>
-                <a:ea typeface="Arial"/>
-                <a:cs typeface="Arial"/>
-                <a:sym typeface="Arial"/>
-              </a:defRPr>
-            </a:lvl9pPr>
-          </a:lstStyle>
-          <a:p>
-            <a:r>
-              <a:rPr lang="de-DE" sz="1200" dirty="0"/>
-              <a:t>Big Data Analytics, HTW Berlin – </a:t>
-            </a:r>
-            <a:r>
-              <a:rPr lang="de-DE" sz="1200" dirty="0" err="1"/>
-              <a:t>July</a:t>
-            </a:r>
-            <a:r>
-              <a:rPr lang="de-DE" sz="1200" dirty="0"/>
-              <a:t> 06, 2021 – Slide 19/19</a:t>
-            </a:r>
-          </a:p>
-        </p:txBody>
-      </p:sp>
-    </p:spTree>
-    <p:extLst>
-      <p:ext uri="{BB962C8B-B14F-4D97-AF65-F5344CB8AC3E}">
-        <p14:creationId xmlns:p14="http://schemas.microsoft.com/office/powerpoint/2010/main" val="3598145271"/>
-      </p:ext>
-    </p:extLst>
   </p:cSld>
   <p:clrMapOvr>
     <a:masterClrMapping/>
@@ -36289,15 +35240,7 @@
           <a:p>
             <a:r>
               <a:rPr lang="de-DE" sz="1200" dirty="0"/>
-              <a:t>Big Data Analytics, HTW Berlin – </a:t>
-            </a:r>
-            <a:r>
-              <a:rPr lang="de-DE" sz="1200" dirty="0" err="1"/>
-              <a:t>July</a:t>
-            </a:r>
-            <a:r>
-              <a:rPr lang="de-DE" sz="1200" dirty="0"/>
-              <a:t> 06, 2021 – Slide 2/19</a:t>
+              <a:t>Big Data Analytics, HTW Berlin – September 21, 2021 – Slide 2/19</a:t>
             </a:r>
           </a:p>
         </p:txBody>
@@ -37966,7 +36909,7 @@
             </a:r>
             <a:r>
               <a:rPr lang="de-DE" dirty="0"/>
-              <a:t> Work On</a:t>
+              <a:t> Work On?</a:t>
             </a:r>
           </a:p>
         </p:txBody>
@@ -38123,46 +37066,6 @@
       </p:pic>
       <p:sp>
         <p:nvSpPr>
-          <p:cNvPr id="10" name="Textfeld 9">
-            <a:extLst>
-              <a:ext uri="{FF2B5EF4-FFF2-40B4-BE49-F238E27FC236}">
-                <a16:creationId xmlns:a16="http://schemas.microsoft.com/office/drawing/2014/main" id="{B34577A5-9003-43D3-B19E-B7E0A171FC82}"/>
-              </a:ext>
-            </a:extLst>
-          </p:cNvPr>
-          <p:cNvSpPr txBox="1"/>
-          <p:nvPr/>
-        </p:nvSpPr>
-        <p:spPr>
-          <a:xfrm>
-            <a:off x="6008527" y="3950638"/>
-            <a:ext cx="500458" cy="215444"/>
-          </a:xfrm>
-          <a:prstGeom prst="rect">
-            <a:avLst/>
-          </a:prstGeom>
-          <a:noFill/>
-        </p:spPr>
-        <p:txBody>
-          <a:bodyPr wrap="none" rtlCol="0">
-            <a:spAutoFit/>
-          </a:bodyPr>
-          <a:lstStyle/>
-          <a:p>
-            <a:r>
-              <a:rPr lang="de-DE" sz="800" dirty="0">
-                <a:solidFill>
-                  <a:schemeClr val="bg1"/>
-                </a:solidFill>
-                <a:latin typeface="+mn-lt"/>
-              </a:rPr>
-              <a:t>[Fig. 1]</a:t>
-            </a:r>
-          </a:p>
-        </p:txBody>
-      </p:sp>
-      <p:sp>
-        <p:nvSpPr>
           <p:cNvPr id="8" name="Google Shape;701;p28">
             <a:extLst>
               <a:ext uri="{FF2B5EF4-FFF2-40B4-BE49-F238E27FC236}">
@@ -38442,16 +37345,65 @@
           <a:p>
             <a:r>
               <a:rPr lang="de-DE" sz="1200" dirty="0"/>
-              <a:t>Big Data Analytics, HTW Berlin – </a:t>
+              <a:t>Big Data Analytics, HTW Berlin – September 21, 2021 – Slide 4/19</a:t>
+            </a:r>
+          </a:p>
+        </p:txBody>
+      </p:sp>
+      <p:sp>
+        <p:nvSpPr>
+          <p:cNvPr id="11" name="Textfeld 10">
+            <a:extLst>
+              <a:ext uri="{FF2B5EF4-FFF2-40B4-BE49-F238E27FC236}">
+                <a16:creationId xmlns:a16="http://schemas.microsoft.com/office/drawing/2014/main" id="{2FDE9382-7FDB-4FA0-9276-03A567FC6CF6}"/>
+              </a:ext>
+            </a:extLst>
+          </p:cNvPr>
+          <p:cNvSpPr txBox="1"/>
+          <p:nvPr/>
+        </p:nvSpPr>
+        <p:spPr>
+          <a:xfrm>
+            <a:off x="6008527" y="3950638"/>
+            <a:ext cx="3009604" cy="415498"/>
+          </a:xfrm>
+          <a:prstGeom prst="rect">
+            <a:avLst/>
+          </a:prstGeom>
+          <a:noFill/>
+        </p:spPr>
+        <p:txBody>
+          <a:bodyPr wrap="square">
+            <a:spAutoFit/>
+          </a:bodyPr>
+          <a:lstStyle/>
+          <a:p>
+            <a:r>
+              <a:rPr lang="en-AU" sz="700" dirty="0">
+                <a:solidFill>
+                  <a:schemeClr val="bg1"/>
+                </a:solidFill>
+              </a:rPr>
+              <a:t>CRISP-DM cycle: </a:t>
             </a:r>
             <a:r>
-              <a:rPr lang="de-DE" sz="1200" dirty="0" err="1"/>
-              <a:t>July</a:t>
+              <a:rPr lang="en-AU" sz="700" dirty="0">
+                <a:solidFill>
+                  <a:schemeClr val="bg1"/>
+                </a:solidFill>
+                <a:hlinkClick r:id="rId4"/>
+              </a:rPr>
+              <a:t>https://miro.medium.com/max/1200/1*2NajmK58hJf8lJQm25iXWw.png</a:t>
             </a:r>
             <a:r>
-              <a:rPr lang="de-DE" sz="1200" dirty="0"/>
-              <a:t> 06, 2021 – Slide 4/19</a:t>
+              <a:rPr lang="en-AU" sz="700" dirty="0">
+                <a:solidFill>
+                  <a:schemeClr val="bg1"/>
+                </a:solidFill>
+              </a:rPr>
+              <a:t> [04.07.2021]</a:t>
             </a:r>
+            <a:endParaRPr lang="de-DE" sz="700" dirty="0"/>
           </a:p>
         </p:txBody>
       </p:sp>
@@ -38532,7 +37484,7 @@
             </a:r>
             <a:r>
               <a:rPr lang="de-DE" dirty="0"/>
-              <a:t> Work On</a:t>
+              <a:t> Work On?</a:t>
             </a:r>
           </a:p>
         </p:txBody>
@@ -38636,7 +37588,7 @@
             <a:r>
               <a:rPr lang="en-AU" dirty="0">
                 <a:solidFill>
-                  <a:schemeClr val="bg1"/>
+                  <a:schemeClr val="accent2"/>
                 </a:solidFill>
               </a:rPr>
               <a:t>Enhancements (counts)</a:t>
@@ -38938,15 +37890,7 @@
           <a:p>
             <a:r>
               <a:rPr lang="de-DE" sz="1200" dirty="0"/>
-              <a:t>Big Data Analytics, HTW Berlin – </a:t>
-            </a:r>
-            <a:r>
-              <a:rPr lang="de-DE" sz="1200" dirty="0" err="1"/>
-              <a:t>July</a:t>
-            </a:r>
-            <a:r>
-              <a:rPr lang="de-DE" sz="1200" dirty="0"/>
-              <a:t> 06, 2021 – Slide 5/19</a:t>
+              <a:t>Big Data Analytics, HTW Berlin – September 21, 2021 – Slide 5/19</a:t>
             </a:r>
           </a:p>
         </p:txBody>
@@ -43275,366 +42219,6 @@
       </p:sp>
       <p:sp>
         <p:nvSpPr>
-          <p:cNvPr id="20" name="Textfeld 19">
-            <a:extLst>
-              <a:ext uri="{FF2B5EF4-FFF2-40B4-BE49-F238E27FC236}">
-                <a16:creationId xmlns:a16="http://schemas.microsoft.com/office/drawing/2014/main" id="{F83A339E-FAE8-4FDE-A312-B0920CD88D07}"/>
-              </a:ext>
-            </a:extLst>
-          </p:cNvPr>
-          <p:cNvSpPr txBox="1"/>
-          <p:nvPr/>
-        </p:nvSpPr>
-        <p:spPr>
-          <a:xfrm>
-            <a:off x="8495292" y="3987849"/>
-            <a:ext cx="500458" cy="215444"/>
-          </a:xfrm>
-          <a:prstGeom prst="rect">
-            <a:avLst/>
-          </a:prstGeom>
-          <a:noFill/>
-        </p:spPr>
-        <p:txBody>
-          <a:bodyPr wrap="none" rtlCol="0">
-            <a:spAutoFit/>
-          </a:bodyPr>
-          <a:lstStyle/>
-          <a:p>
-            <a:r>
-              <a:rPr lang="de-DE" sz="800" dirty="0">
-                <a:solidFill>
-                  <a:schemeClr val="bg1"/>
-                </a:solidFill>
-                <a:latin typeface="+mn-lt"/>
-              </a:rPr>
-              <a:t>[Fig. 8]</a:t>
-            </a:r>
-          </a:p>
-        </p:txBody>
-      </p:sp>
-      <p:sp>
-        <p:nvSpPr>
-          <p:cNvPr id="21" name="Textfeld 20">
-            <a:extLst>
-              <a:ext uri="{FF2B5EF4-FFF2-40B4-BE49-F238E27FC236}">
-                <a16:creationId xmlns:a16="http://schemas.microsoft.com/office/drawing/2014/main" id="{166D5511-6926-4A24-8B7C-1ADA3C2B3F54}"/>
-              </a:ext>
-            </a:extLst>
-          </p:cNvPr>
-          <p:cNvSpPr txBox="1"/>
-          <p:nvPr/>
-        </p:nvSpPr>
-        <p:spPr>
-          <a:xfrm>
-            <a:off x="6888927" y="3819400"/>
-            <a:ext cx="500458" cy="215444"/>
-          </a:xfrm>
-          <a:prstGeom prst="rect">
-            <a:avLst/>
-          </a:prstGeom>
-          <a:noFill/>
-        </p:spPr>
-        <p:txBody>
-          <a:bodyPr wrap="none" rtlCol="0">
-            <a:spAutoFit/>
-          </a:bodyPr>
-          <a:lstStyle/>
-          <a:p>
-            <a:r>
-              <a:rPr lang="de-DE" sz="800" dirty="0">
-                <a:solidFill>
-                  <a:schemeClr val="bg1"/>
-                </a:solidFill>
-                <a:latin typeface="+mn-lt"/>
-              </a:rPr>
-              <a:t>[Fig. 9]</a:t>
-            </a:r>
-          </a:p>
-        </p:txBody>
-      </p:sp>
-      <p:sp>
-        <p:nvSpPr>
-          <p:cNvPr id="22" name="Textfeld 21">
-            <a:extLst>
-              <a:ext uri="{FF2B5EF4-FFF2-40B4-BE49-F238E27FC236}">
-                <a16:creationId xmlns:a16="http://schemas.microsoft.com/office/drawing/2014/main" id="{01700773-9412-4B72-AA2B-7B6C1FFD148C}"/>
-              </a:ext>
-            </a:extLst>
-          </p:cNvPr>
-          <p:cNvSpPr txBox="1"/>
-          <p:nvPr/>
-        </p:nvSpPr>
-        <p:spPr>
-          <a:xfrm>
-            <a:off x="5282562" y="3848374"/>
-            <a:ext cx="500458" cy="215444"/>
-          </a:xfrm>
-          <a:prstGeom prst="rect">
-            <a:avLst/>
-          </a:prstGeom>
-          <a:noFill/>
-        </p:spPr>
-        <p:txBody>
-          <a:bodyPr wrap="none" rtlCol="0">
-            <a:spAutoFit/>
-          </a:bodyPr>
-          <a:lstStyle/>
-          <a:p>
-            <a:r>
-              <a:rPr lang="de-DE" sz="800" dirty="0">
-                <a:solidFill>
-                  <a:schemeClr val="bg1"/>
-                </a:solidFill>
-                <a:latin typeface="+mn-lt"/>
-              </a:rPr>
-              <a:t>[Fig. 7]</a:t>
-            </a:r>
-          </a:p>
-        </p:txBody>
-      </p:sp>
-      <p:sp>
-        <p:nvSpPr>
-          <p:cNvPr id="30" name="Textfeld 29">
-            <a:extLst>
-              <a:ext uri="{FF2B5EF4-FFF2-40B4-BE49-F238E27FC236}">
-                <a16:creationId xmlns:a16="http://schemas.microsoft.com/office/drawing/2014/main" id="{29881C0F-0A16-48E2-A0D0-EEAA3DF6F793}"/>
-              </a:ext>
-            </a:extLst>
-          </p:cNvPr>
-          <p:cNvSpPr txBox="1"/>
-          <p:nvPr/>
-        </p:nvSpPr>
-        <p:spPr>
-          <a:xfrm>
-            <a:off x="7951203" y="1621985"/>
-            <a:ext cx="500458" cy="215444"/>
-          </a:xfrm>
-          <a:prstGeom prst="rect">
-            <a:avLst/>
-          </a:prstGeom>
-          <a:noFill/>
-        </p:spPr>
-        <p:txBody>
-          <a:bodyPr wrap="none" rtlCol="0">
-            <a:spAutoFit/>
-          </a:bodyPr>
-          <a:lstStyle/>
-          <a:p>
-            <a:r>
-              <a:rPr lang="de-DE" sz="800" dirty="0">
-                <a:solidFill>
-                  <a:schemeClr val="bg1"/>
-                </a:solidFill>
-                <a:latin typeface="+mn-lt"/>
-              </a:rPr>
-              <a:t>[Fig. 6]</a:t>
-            </a:r>
-          </a:p>
-        </p:txBody>
-      </p:sp>
-      <p:sp>
-        <p:nvSpPr>
-          <p:cNvPr id="31" name="Textfeld 30">
-            <a:extLst>
-              <a:ext uri="{FF2B5EF4-FFF2-40B4-BE49-F238E27FC236}">
-                <a16:creationId xmlns:a16="http://schemas.microsoft.com/office/drawing/2014/main" id="{FC62405A-C0B8-41A4-9781-B67AEF66E532}"/>
-              </a:ext>
-            </a:extLst>
-          </p:cNvPr>
-          <p:cNvSpPr txBox="1"/>
-          <p:nvPr/>
-        </p:nvSpPr>
-        <p:spPr>
-          <a:xfrm>
-            <a:off x="7119177" y="1648268"/>
-            <a:ext cx="500458" cy="215444"/>
-          </a:xfrm>
-          <a:prstGeom prst="rect">
-            <a:avLst/>
-          </a:prstGeom>
-          <a:noFill/>
-        </p:spPr>
-        <p:txBody>
-          <a:bodyPr wrap="none" rtlCol="0">
-            <a:spAutoFit/>
-          </a:bodyPr>
-          <a:lstStyle/>
-          <a:p>
-            <a:r>
-              <a:rPr lang="de-DE" sz="800" dirty="0">
-                <a:solidFill>
-                  <a:schemeClr val="bg1"/>
-                </a:solidFill>
-                <a:latin typeface="+mn-lt"/>
-              </a:rPr>
-              <a:t>[Fig. 5]</a:t>
-            </a:r>
-          </a:p>
-        </p:txBody>
-      </p:sp>
-      <p:sp>
-        <p:nvSpPr>
-          <p:cNvPr id="32" name="Textfeld 31">
-            <a:extLst>
-              <a:ext uri="{FF2B5EF4-FFF2-40B4-BE49-F238E27FC236}">
-                <a16:creationId xmlns:a16="http://schemas.microsoft.com/office/drawing/2014/main" id="{59A1F77F-5008-407F-A122-3BB72138314F}"/>
-              </a:ext>
-            </a:extLst>
-          </p:cNvPr>
-          <p:cNvSpPr txBox="1"/>
-          <p:nvPr/>
-        </p:nvSpPr>
-        <p:spPr>
-          <a:xfrm>
-            <a:off x="2013225" y="1558076"/>
-            <a:ext cx="500458" cy="215444"/>
-          </a:xfrm>
-          <a:prstGeom prst="rect">
-            <a:avLst/>
-          </a:prstGeom>
-          <a:noFill/>
-        </p:spPr>
-        <p:txBody>
-          <a:bodyPr wrap="none" rtlCol="0">
-            <a:spAutoFit/>
-          </a:bodyPr>
-          <a:lstStyle/>
-          <a:p>
-            <a:r>
-              <a:rPr lang="de-DE" sz="800" dirty="0">
-                <a:solidFill>
-                  <a:schemeClr val="bg1"/>
-                </a:solidFill>
-                <a:latin typeface="+mn-lt"/>
-              </a:rPr>
-              <a:t>[Fig. 5]</a:t>
-            </a:r>
-          </a:p>
-        </p:txBody>
-      </p:sp>
-      <p:sp>
-        <p:nvSpPr>
-          <p:cNvPr id="33" name="Textfeld 32">
-            <a:extLst>
-              <a:ext uri="{FF2B5EF4-FFF2-40B4-BE49-F238E27FC236}">
-                <a16:creationId xmlns:a16="http://schemas.microsoft.com/office/drawing/2014/main" id="{00E51DF4-0831-4F97-99C1-366CCC0CF6AB}"/>
-              </a:ext>
-            </a:extLst>
-          </p:cNvPr>
-          <p:cNvSpPr txBox="1"/>
-          <p:nvPr/>
-        </p:nvSpPr>
-        <p:spPr>
-          <a:xfrm>
-            <a:off x="4430059" y="1687436"/>
-            <a:ext cx="500458" cy="215444"/>
-          </a:xfrm>
-          <a:prstGeom prst="rect">
-            <a:avLst/>
-          </a:prstGeom>
-          <a:noFill/>
-        </p:spPr>
-        <p:txBody>
-          <a:bodyPr wrap="none" rtlCol="0">
-            <a:spAutoFit/>
-          </a:bodyPr>
-          <a:lstStyle/>
-          <a:p>
-            <a:r>
-              <a:rPr lang="de-DE" sz="800" dirty="0">
-                <a:solidFill>
-                  <a:schemeClr val="bg1"/>
-                </a:solidFill>
-                <a:latin typeface="+mn-lt"/>
-              </a:rPr>
-              <a:t>[Fig. 4]</a:t>
-            </a:r>
-          </a:p>
-        </p:txBody>
-      </p:sp>
-      <p:sp>
-        <p:nvSpPr>
-          <p:cNvPr id="34" name="Textfeld 33">
-            <a:extLst>
-              <a:ext uri="{FF2B5EF4-FFF2-40B4-BE49-F238E27FC236}">
-                <a16:creationId xmlns:a16="http://schemas.microsoft.com/office/drawing/2014/main" id="{8D52D077-E0EE-4753-95C7-94C72B38A790}"/>
-              </a:ext>
-            </a:extLst>
-          </p:cNvPr>
-          <p:cNvSpPr txBox="1"/>
-          <p:nvPr/>
-        </p:nvSpPr>
-        <p:spPr>
-          <a:xfrm>
-            <a:off x="3180413" y="3780612"/>
-            <a:ext cx="500458" cy="215444"/>
-          </a:xfrm>
-          <a:prstGeom prst="rect">
-            <a:avLst/>
-          </a:prstGeom>
-          <a:noFill/>
-        </p:spPr>
-        <p:txBody>
-          <a:bodyPr wrap="none" rtlCol="0">
-            <a:spAutoFit/>
-          </a:bodyPr>
-          <a:lstStyle/>
-          <a:p>
-            <a:r>
-              <a:rPr lang="de-DE" sz="800" dirty="0">
-                <a:solidFill>
-                  <a:schemeClr val="bg1"/>
-                </a:solidFill>
-                <a:latin typeface="+mn-lt"/>
-              </a:rPr>
-              <a:t>[Fig. 2]</a:t>
-            </a:r>
-          </a:p>
-        </p:txBody>
-      </p:sp>
-      <p:sp>
-        <p:nvSpPr>
-          <p:cNvPr id="35" name="Textfeld 34">
-            <a:extLst>
-              <a:ext uri="{FF2B5EF4-FFF2-40B4-BE49-F238E27FC236}">
-                <a16:creationId xmlns:a16="http://schemas.microsoft.com/office/drawing/2014/main" id="{880848F5-A8A7-48BC-86C3-ED5C0D506776}"/>
-              </a:ext>
-            </a:extLst>
-          </p:cNvPr>
-          <p:cNvSpPr txBox="1"/>
-          <p:nvPr/>
-        </p:nvSpPr>
-        <p:spPr>
-          <a:xfrm>
-            <a:off x="1997396" y="3803286"/>
-            <a:ext cx="500458" cy="215444"/>
-          </a:xfrm>
-          <a:prstGeom prst="rect">
-            <a:avLst/>
-          </a:prstGeom>
-          <a:noFill/>
-        </p:spPr>
-        <p:txBody>
-          <a:bodyPr wrap="none" rtlCol="0">
-            <a:spAutoFit/>
-          </a:bodyPr>
-          <a:lstStyle/>
-          <a:p>
-            <a:r>
-              <a:rPr lang="de-DE" sz="800" dirty="0">
-                <a:solidFill>
-                  <a:schemeClr val="bg1"/>
-                </a:solidFill>
-                <a:latin typeface="+mn-lt"/>
-              </a:rPr>
-              <a:t>[Fig. 3]</a:t>
-            </a:r>
-          </a:p>
-        </p:txBody>
-      </p:sp>
-      <p:sp>
-        <p:nvSpPr>
           <p:cNvPr id="36" name="Google Shape;701;p28">
             <a:extLst>
               <a:ext uri="{FF2B5EF4-FFF2-40B4-BE49-F238E27FC236}">
@@ -43914,15 +42498,7 @@
           <a:p>
             <a:r>
               <a:rPr lang="de-DE" sz="1200" dirty="0"/>
-              <a:t>Big Data Analytics, HTW Berlin – </a:t>
-            </a:r>
-            <a:r>
-              <a:rPr lang="de-DE" sz="1200" dirty="0" err="1"/>
-              <a:t>July</a:t>
-            </a:r>
-            <a:r>
-              <a:rPr lang="de-DE" sz="1200" dirty="0"/>
-              <a:t> 06, 2021 – Slide 7/19</a:t>
+              <a:t>Big Data Analytics, HTW Berlin – September 21, 2021 – Slide 7/19</a:t>
             </a:r>
           </a:p>
         </p:txBody>
@@ -43979,8 +42555,8 @@
         </p:blipFill>
         <p:spPr>
           <a:xfrm>
-            <a:off x="3536416" y="182033"/>
-            <a:ext cx="5421318" cy="4779433"/>
+            <a:off x="3698322" y="324769"/>
+            <a:ext cx="5259412" cy="4636697"/>
           </a:xfrm>
           <a:prstGeom prst="rect">
             <a:avLst/>
@@ -45354,15 +43930,7 @@
           <a:p>
             <a:r>
               <a:rPr lang="de-DE" sz="1200" dirty="0"/>
-              <a:t>Big Data Analytics, HTW Berlin – </a:t>
-            </a:r>
-            <a:r>
-              <a:rPr lang="de-DE" sz="1200" dirty="0" err="1"/>
-              <a:t>July</a:t>
-            </a:r>
-            <a:r>
-              <a:rPr lang="de-DE" sz="1200" dirty="0"/>
-              <a:t> 06, 2021 – Slide 8/19</a:t>
+              <a:t>Big Data Analytics, HTW Berlin – September 21, 2021 – Slide 8/19</a:t>
             </a:r>
           </a:p>
         </p:txBody>
@@ -46080,21 +44648,8 @@
                   <a:schemeClr val="accent2"/>
                 </a:solidFill>
               </a:rPr>
-              <a:t> Image </a:t>
+              <a:t> Image Building</a:t>
             </a:r>
-            <a:r>
-              <a:rPr lang="de-DE" sz="2000" dirty="0" err="1">
-                <a:solidFill>
-                  <a:schemeClr val="accent2"/>
-                </a:solidFill>
-              </a:rPr>
-              <a:t>building</a:t>
-            </a:r>
-            <a:endParaRPr lang="de-DE" sz="2000" dirty="0">
-              <a:solidFill>
-                <a:schemeClr val="accent2"/>
-              </a:solidFill>
-            </a:endParaRPr>
           </a:p>
         </p:txBody>
       </p:sp>
@@ -46399,21 +44954,8 @@
                   <a:schemeClr val="accent2"/>
                 </a:solidFill>
               </a:rPr>
-              <a:t> </a:t>
+              <a:t> Microservices</a:t>
             </a:r>
-            <a:r>
-              <a:rPr lang="de-DE" sz="2000" dirty="0" err="1">
-                <a:solidFill>
-                  <a:schemeClr val="accent2"/>
-                </a:solidFill>
-              </a:rPr>
-              <a:t>microservices</a:t>
-            </a:r>
-            <a:endParaRPr lang="de-DE" sz="2000" dirty="0">
-              <a:solidFill>
-                <a:schemeClr val="accent2"/>
-              </a:solidFill>
-            </a:endParaRPr>
           </a:p>
         </p:txBody>
       </p:sp>
@@ -46710,21 +45252,8 @@
                   <a:schemeClr val="accent2"/>
                 </a:solidFill>
               </a:rPr>
-              <a:t> </a:t>
+              <a:t> Packages</a:t>
             </a:r>
-            <a:r>
-              <a:rPr lang="de-DE" sz="2000" dirty="0" err="1">
-                <a:solidFill>
-                  <a:schemeClr val="accent2"/>
-                </a:solidFill>
-              </a:rPr>
-              <a:t>packages</a:t>
-            </a:r>
-            <a:endParaRPr lang="de-DE" sz="2000" dirty="0">
-              <a:solidFill>
-                <a:schemeClr val="accent2"/>
-              </a:solidFill>
-            </a:endParaRPr>
           </a:p>
         </p:txBody>
       </p:sp>
@@ -49495,15 +48024,7 @@
           <a:p>
             <a:r>
               <a:rPr lang="de-DE" sz="1200" dirty="0"/>
-              <a:t>Big Data Analytics, HTW Berlin – </a:t>
-            </a:r>
-            <a:r>
-              <a:rPr lang="de-DE" sz="1200" dirty="0" err="1"/>
-              <a:t>July</a:t>
-            </a:r>
-            <a:r>
-              <a:rPr lang="de-DE" sz="1200" dirty="0"/>
-              <a:t> 06, 2021 – Slide 9/19</a:t>
+              <a:t>Big Data Analytics, HTW Berlin – September 21, 2021 – Slide 9/19</a:t>
             </a:r>
           </a:p>
         </p:txBody>

</xml_diff>

<commit_message>
Added missing word in architecture slide.
</commit_message>
<xml_diff>
--- a/presentation.pptx
+++ b/presentation.pptx
@@ -49466,7 +49466,7 @@
         </p:nvSpPr>
         <p:spPr>
           <a:xfrm>
-            <a:off x="5856636" y="2360001"/>
+            <a:off x="5856636" y="2346376"/>
             <a:ext cx="3065498" cy="472673"/>
           </a:xfrm>
           <a:prstGeom prst="rect">
@@ -49826,6 +49826,14 @@
                 </a:solidFill>
               </a:rPr>
               <a:t>using</a:t>
+            </a:r>
+            <a:r>
+              <a:rPr lang="de-DE" sz="1600">
+                <a:solidFill>
+                  <a:schemeClr val="accent1"/>
+                </a:solidFill>
+              </a:rPr>
+              <a:t> HTTP</a:t>
             </a:r>
             <a:endParaRPr lang="de-DE" sz="1600" dirty="0">
               <a:solidFill>

</xml_diff>

<commit_message>
Coloured keyword in slide.
</commit_message>
<xml_diff>
--- a/presentation.pptx
+++ b/presentation.pptx
@@ -49828,18 +49828,13 @@
               <a:t>using</a:t>
             </a:r>
             <a:r>
-              <a:rPr lang="de-DE" sz="1600">
+              <a:rPr lang="de-DE" sz="1600" dirty="0">
                 <a:solidFill>
                   <a:schemeClr val="accent1"/>
                 </a:solidFill>
               </a:rPr>
               <a:t> HTTP</a:t>
             </a:r>
-            <a:endParaRPr lang="de-DE" sz="1600" dirty="0">
-              <a:solidFill>
-                <a:schemeClr val="accent1"/>
-              </a:solidFill>
-            </a:endParaRPr>
           </a:p>
         </p:txBody>
       </p:sp>
@@ -55685,7 +55680,23 @@
                   <a:schemeClr val="tx1"/>
                 </a:solidFill>
               </a:rPr>
-              <a:t>In this project: Dashboard and </a:t>
+              <a:t>In this project: </a:t>
+            </a:r>
+            <a:r>
+              <a:rPr lang="en-US" dirty="0">
+                <a:solidFill>
+                  <a:schemeClr val="accent2"/>
+                </a:solidFill>
+              </a:rPr>
+              <a:t>Dashboard</a:t>
+            </a:r>
+            <a:r>
+              <a:rPr lang="en-US" dirty="0">
+                <a:solidFill>
+                  <a:schemeClr val="tx1"/>
+                </a:solidFill>
+              </a:rPr>
+              <a:t> and </a:t>
             </a:r>
             <a:r>
               <a:rPr lang="en-US" dirty="0">

</xml_diff>

<commit_message>
Fixed typo in presentation / Added comments.
</commit_message>
<xml_diff>
--- a/presentation.pptx
+++ b/presentation.pptx
@@ -33,7 +33,7 @@
   <p:notesSz cx="6858000" cy="9144000"/>
   <p:embeddedFontLst>
     <p:embeddedFont>
-      <p:font typeface="Livvic" panose="020B0604020202020204" charset="0"/>
+      <p:font typeface="Livvic" pitchFamily="2" charset="0"/>
       <p:regular r:id="rId23"/>
       <p:bold r:id="rId24"/>
       <p:italic r:id="rId25"/>
@@ -2273,8 +2273,21 @@
             </a:pPr>
             <a:r>
               <a:rPr lang="de-DE" dirty="0"/>
-              <a:t>Laden kleinerer Datensätze möglich (mehrfach)</a:t>
+              <a:t>Laden kleinerer Datensätze möglich (mehrfach) =&gt; </a:t>
             </a:r>
+            <a:r>
+              <a:rPr lang="de-DE" dirty="0" err="1"/>
+              <a:t>split</a:t>
+            </a:r>
+            <a:r>
+              <a:rPr lang="de-DE" dirty="0"/>
+              <a:t> sh </a:t>
+            </a:r>
+            <a:r>
+              <a:rPr lang="de-DE"/>
+              <a:t>skript</a:t>
+            </a:r>
+            <a:endParaRPr lang="de-DE" dirty="0"/>
           </a:p>
           <a:p>
             <a:pPr marL="171450" lvl="0" indent="-171450" algn="l" rtl="0">
@@ -4267,7 +4280,15 @@
             </a:r>
             <a:r>
               <a:rPr lang="de-DE" dirty="0"/>
-              <a:t> DB</a:t>
+              <a:t> DB (Update Skript: nur </a:t>
+            </a:r>
+            <a:r>
+              <a:rPr lang="de-DE" dirty="0" err="1"/>
+              <a:t>write</a:t>
+            </a:r>
+            <a:r>
+              <a:rPr lang="de-DE" dirty="0"/>
+              <a:t>)</a:t>
             </a:r>
           </a:p>
           <a:p>
@@ -35471,7 +35492,7 @@
                 <a:effectLst/>
                 <a:latin typeface="Roboto" panose="02000000000000000000" pitchFamily="2" charset="0"/>
               </a:rPr>
-              <a:t>Possibility add new data in small batches</a:t>
+              <a:t>Possibility to add new data in small batches</a:t>
             </a:r>
             <a:endParaRPr lang="en-US" dirty="0">
               <a:solidFill>

</xml_diff>